<commit_message>
First version of the presentation
</commit_message>
<xml_diff>
--- a/Week 3/QaBook.pptx
+++ b/Week 3/QaBook.pptx
@@ -5,14 +5,18 @@
     <p:sldMasterId id="2147483689" r:id="rId1"/>
   </p:sldMasterIdLst>
   <p:notesMasterIdLst>
-    <p:notesMasterId r:id="rId4"/>
+    <p:notesMasterId r:id="rId8"/>
   </p:notesMasterIdLst>
   <p:handoutMasterIdLst>
-    <p:handoutMasterId r:id="rId5"/>
+    <p:handoutMasterId r:id="rId9"/>
   </p:handoutMasterIdLst>
   <p:sldIdLst>
     <p:sldId id="256" r:id="rId2"/>
-    <p:sldId id="257" r:id="rId3"/>
+    <p:sldId id="258" r:id="rId3"/>
+    <p:sldId id="257" r:id="rId4"/>
+    <p:sldId id="259" r:id="rId5"/>
+    <p:sldId id="260" r:id="rId6"/>
+    <p:sldId id="261" r:id="rId7"/>
   </p:sldIdLst>
   <p:sldSz cx="12192000" cy="6858000"/>
   <p:notesSz cx="6858000" cy="9144000"/>
@@ -6967,6 +6971,11 @@
           <a:bodyPr/>
           <a:lstStyle/>
           <a:p>
+            <a:pPr algn="r"/>
+            <a:r>
+              <a:rPr lang="en-US" dirty="0" smtClean="0"/>
+              <a:t>www.qabook.com</a:t>
+            </a:r>
             <a:endParaRPr lang="bg-BG" dirty="0"/>
           </a:p>
         </p:txBody>
@@ -7103,7 +7112,66 @@
           <a:bodyPr/>
           <a:lstStyle/>
           <a:p>
-            <a:endParaRPr lang="bg-BG"/>
+            <a:r>
+              <a:rPr lang="en-US" dirty="0" smtClean="0"/>
+              <a:t>Peer to peer solution (Free)</a:t>
+            </a:r>
+          </a:p>
+          <a:p>
+            <a:pPr lvl="1"/>
+            <a:r>
+              <a:rPr lang="en-US" dirty="0" smtClean="0"/>
+              <a:t>Fully licensed</a:t>
+            </a:r>
+          </a:p>
+          <a:p>
+            <a:pPr lvl="1"/>
+            <a:r>
+              <a:rPr lang="en-US" dirty="0" smtClean="0"/>
+              <a:t>Build up local repository of requirements and test cases</a:t>
+            </a:r>
+          </a:p>
+          <a:p>
+            <a:pPr lvl="1"/>
+            <a:r>
+              <a:rPr lang="en-US" dirty="0" smtClean="0"/>
+              <a:t>Export to QABook file types or excel</a:t>
+            </a:r>
+          </a:p>
+          <a:p>
+            <a:pPr lvl="1"/>
+            <a:r>
+              <a:rPr lang="en-US" dirty="0" smtClean="0"/>
+              <a:t>Upload to a centralized repository</a:t>
+            </a:r>
+          </a:p>
+          <a:p>
+            <a:r>
+              <a:rPr lang="en-US" dirty="0" smtClean="0"/>
+              <a:t>Client Server Solution</a:t>
+            </a:r>
+          </a:p>
+          <a:p>
+            <a:pPr lvl="1"/>
+            <a:r>
+              <a:rPr lang="en-US" dirty="0" smtClean="0"/>
+              <a:t>Allows simultaneous work for multiple users</a:t>
+            </a:r>
+          </a:p>
+          <a:p>
+            <a:pPr lvl="1"/>
+            <a:r>
+              <a:rPr lang="en-US" dirty="0" smtClean="0"/>
+              <a:t>Allows user permission settings</a:t>
+            </a:r>
+          </a:p>
+          <a:p>
+            <a:pPr lvl="1"/>
+            <a:r>
+              <a:rPr lang="en-US" dirty="0" smtClean="0"/>
+              <a:t>30-day free trial</a:t>
+            </a:r>
+            <a:endParaRPr lang="bg-BG" dirty="0"/>
           </a:p>
         </p:txBody>
       </p:sp>
@@ -7122,7 +7190,11 @@
           <a:bodyPr/>
           <a:lstStyle/>
           <a:p>
-            <a:endParaRPr lang="bg-BG"/>
+            <a:r>
+              <a:rPr lang="en-US" dirty="0" smtClean="0"/>
+              <a:t>Available versions</a:t>
+            </a:r>
+            <a:endParaRPr lang="bg-BG" dirty="0"/>
           </a:p>
         </p:txBody>
       </p:sp>
@@ -7171,6 +7243,145 @@
             <a:fld id="{D57F1E4F-1CFF-5643-939E-02111984F565}" type="slidenum">
               <a:rPr lang="en-US" smtClean="0"/>
               <a:t>2</a:t>
+            </a:fld>
+            <a:endParaRPr lang="en-US" dirty="0"/>
+          </a:p>
+        </p:txBody>
+      </p:sp>
+    </p:spTree>
+    <p:extLst>
+      <p:ext uri="{BB962C8B-B14F-4D97-AF65-F5344CB8AC3E}">
+        <p14:creationId xmlns:p14="http://schemas.microsoft.com/office/powerpoint/2010/main" val="1705265512"/>
+      </p:ext>
+    </p:extLst>
+  </p:cSld>
+  <p:clrMapOvr>
+    <a:masterClrMapping/>
+  </p:clrMapOvr>
+  <p:timing>
+    <p:tnLst>
+      <p:par>
+        <p:cTn id="1" dur="indefinite" restart="never" nodeType="tmRoot"/>
+      </p:par>
+    </p:tnLst>
+  </p:timing>
+</p:sld>
+</file>
+
+<file path=ppt/slides/slide3.xml><?xml version="1.0" encoding="utf-8"?>
+<p:sld xmlns:a="http://schemas.openxmlformats.org/drawingml/2006/main" xmlns:r="http://schemas.openxmlformats.org/officeDocument/2006/relationships" xmlns:p="http://schemas.openxmlformats.org/presentationml/2006/main">
+  <p:cSld>
+    <p:spTree>
+      <p:nvGrpSpPr>
+        <p:cNvPr id="1" name=""/>
+        <p:cNvGrpSpPr/>
+        <p:nvPr/>
+      </p:nvGrpSpPr>
+      <p:grpSpPr>
+        <a:xfrm>
+          <a:off x="0" y="0"/>
+          <a:ext cx="0" cy="0"/>
+          <a:chOff x="0" y="0"/>
+          <a:chExt cx="0" cy="0"/>
+        </a:xfrm>
+      </p:grpSpPr>
+      <p:pic>
+        <p:nvPicPr>
+          <p:cNvPr id="9" name="Контейнер за съдържание 8"/>
+          <p:cNvPicPr>
+            <a:picLocks noGrp="1" noChangeAspect="1"/>
+          </p:cNvPicPr>
+          <p:nvPr>
+            <p:ph idx="1"/>
+          </p:nvPr>
+        </p:nvPicPr>
+        <p:blipFill>
+          <a:blip r:embed="rId2">
+            <a:extLst>
+              <a:ext uri="{28A0092B-C50C-407E-A947-70E740481C1C}">
+                <a14:useLocalDpi xmlns:a14="http://schemas.microsoft.com/office/drawing/2010/main" val="0"/>
+              </a:ext>
+            </a:extLst>
+          </a:blip>
+          <a:stretch>
+            <a:fillRect/>
+          </a:stretch>
+        </p:blipFill>
+        <p:spPr>
+          <a:xfrm>
+            <a:off x="1204913" y="2112169"/>
+            <a:ext cx="8743950" cy="4076700"/>
+          </a:xfrm>
+        </p:spPr>
+      </p:pic>
+      <p:sp>
+        <p:nvSpPr>
+          <p:cNvPr id="3" name="Заглавие 2"/>
+          <p:cNvSpPr>
+            <a:spLocks noGrp="1"/>
+          </p:cNvSpPr>
+          <p:nvPr>
+            <p:ph type="title"/>
+          </p:nvPr>
+        </p:nvSpPr>
+        <p:spPr/>
+        <p:txBody>
+          <a:bodyPr/>
+          <a:lstStyle/>
+          <a:p>
+            <a:r>
+              <a:rPr lang="en-US" dirty="0"/>
+              <a:t>Available versions</a:t>
+            </a:r>
+            <a:endParaRPr lang="bg-BG" dirty="0"/>
+          </a:p>
+        </p:txBody>
+      </p:sp>
+      <p:sp>
+        <p:nvSpPr>
+          <p:cNvPr id="4" name="Контейнер за долния колонтитул 3"/>
+          <p:cNvSpPr>
+            <a:spLocks noGrp="1"/>
+          </p:cNvSpPr>
+          <p:nvPr>
+            <p:ph type="ftr" sz="quarter" idx="11"/>
+          </p:nvPr>
+        </p:nvSpPr>
+        <p:spPr/>
+        <p:txBody>
+          <a:bodyPr/>
+          <a:lstStyle/>
+          <a:p>
+            <a:r>
+              <a:rPr lang="en-US" smtClean="0">
+                <a:latin typeface="Chiller" panose="04020404031007020602" pitchFamily="82" charset="0"/>
+              </a:rPr>
+              <a:t>Team Lich</a:t>
+            </a:r>
+            <a:endParaRPr lang="en-US" dirty="0">
+              <a:latin typeface="Chiller" panose="04020404031007020602" pitchFamily="82" charset="0"/>
+            </a:endParaRPr>
+          </a:p>
+        </p:txBody>
+      </p:sp>
+      <p:sp>
+        <p:nvSpPr>
+          <p:cNvPr id="5" name="Контейнер за номер на слайда 4"/>
+          <p:cNvSpPr>
+            <a:spLocks noGrp="1"/>
+          </p:cNvSpPr>
+          <p:nvPr>
+            <p:ph type="sldNum" sz="quarter" idx="12"/>
+          </p:nvPr>
+        </p:nvSpPr>
+        <p:spPr/>
+        <p:txBody>
+          <a:bodyPr/>
+          <a:lstStyle/>
+          <a:p>
+            <a:fld id="{D57F1E4F-1CFF-5643-939E-02111984F565}" type="slidenum">
+              <a:rPr lang="en-US" smtClean="0"/>
+              <a:t>3</a:t>
             </a:fld>
             <a:endParaRPr lang="en-US" dirty="0"/>
           </a:p>
@@ -7193,6 +7404,456 @@
       </p:par>
     </p:tnLst>
   </p:timing>
+</p:sld>
+</file>
+
+<file path=ppt/slides/slide4.xml><?xml version="1.0" encoding="utf-8"?>
+<p:sld xmlns:a="http://schemas.openxmlformats.org/drawingml/2006/main" xmlns:r="http://schemas.openxmlformats.org/officeDocument/2006/relationships" xmlns:p="http://schemas.openxmlformats.org/presentationml/2006/main">
+  <p:cSld>
+    <p:spTree>
+      <p:nvGrpSpPr>
+        <p:cNvPr id="1" name=""/>
+        <p:cNvGrpSpPr/>
+        <p:nvPr/>
+      </p:nvGrpSpPr>
+      <p:grpSpPr>
+        <a:xfrm>
+          <a:off x="0" y="0"/>
+          <a:ext cx="0" cy="0"/>
+          <a:chOff x="0" y="0"/>
+          <a:chExt cx="0" cy="0"/>
+        </a:xfrm>
+      </p:grpSpPr>
+      <p:sp>
+        <p:nvSpPr>
+          <p:cNvPr id="2" name="Контейнер за съдържание 1"/>
+          <p:cNvSpPr>
+            <a:spLocks noGrp="1"/>
+          </p:cNvSpPr>
+          <p:nvPr>
+            <p:ph idx="1"/>
+          </p:nvPr>
+        </p:nvSpPr>
+        <p:spPr/>
+        <p:txBody>
+          <a:bodyPr/>
+          <a:lstStyle/>
+          <a:p>
+            <a:endParaRPr lang="en-US" dirty="0" smtClean="0"/>
+          </a:p>
+          <a:p>
+            <a:r>
+              <a:rPr lang="en-US" dirty="0" smtClean="0"/>
+              <a:t>Complete feature rich test management solution </a:t>
+            </a:r>
+          </a:p>
+          <a:p>
+            <a:r>
+              <a:rPr lang="en-US" dirty="0" smtClean="0"/>
+              <a:t>Features are not limited in the free version only collaboration</a:t>
+            </a:r>
+          </a:p>
+          <a:p>
+            <a:r>
+              <a:rPr lang="en-US" dirty="0" smtClean="0"/>
+              <a:t>UI</a:t>
+            </a:r>
+          </a:p>
+          <a:p>
+            <a:r>
+              <a:rPr lang="en-US" dirty="0" smtClean="0"/>
+              <a:t>Raise defects</a:t>
+            </a:r>
+          </a:p>
+          <a:p>
+            <a:r>
+              <a:rPr lang="en-US" dirty="0" smtClean="0"/>
+              <a:t>Report generation</a:t>
+            </a:r>
+          </a:p>
+          <a:p>
+            <a:r>
+              <a:rPr lang="en-US" dirty="0" smtClean="0"/>
+              <a:t>Import from Excel</a:t>
+            </a:r>
+          </a:p>
+          <a:p>
+            <a:pPr marL="0" indent="0">
+              <a:buNone/>
+            </a:pPr>
+            <a:endParaRPr lang="en-US" dirty="0" smtClean="0"/>
+          </a:p>
+          <a:p>
+            <a:endParaRPr lang="en-US" dirty="0" smtClean="0"/>
+          </a:p>
+          <a:p>
+            <a:endParaRPr lang="bg-BG" dirty="0"/>
+          </a:p>
+        </p:txBody>
+      </p:sp>
+      <p:sp>
+        <p:nvSpPr>
+          <p:cNvPr id="3" name="Заглавие 2"/>
+          <p:cNvSpPr>
+            <a:spLocks noGrp="1"/>
+          </p:cNvSpPr>
+          <p:nvPr>
+            <p:ph type="title"/>
+          </p:nvPr>
+        </p:nvSpPr>
+        <p:spPr/>
+        <p:txBody>
+          <a:bodyPr/>
+          <a:lstStyle/>
+          <a:p>
+            <a:r>
+              <a:rPr lang="en-US" dirty="0" smtClean="0"/>
+              <a:t>What’s good</a:t>
+            </a:r>
+            <a:endParaRPr lang="bg-BG" dirty="0"/>
+          </a:p>
+        </p:txBody>
+      </p:sp>
+      <p:sp>
+        <p:nvSpPr>
+          <p:cNvPr id="4" name="Контейнер за долния колонтитул 3"/>
+          <p:cNvSpPr>
+            <a:spLocks noGrp="1"/>
+          </p:cNvSpPr>
+          <p:nvPr>
+            <p:ph type="ftr" sz="quarter" idx="11"/>
+          </p:nvPr>
+        </p:nvSpPr>
+        <p:spPr/>
+        <p:txBody>
+          <a:bodyPr/>
+          <a:lstStyle/>
+          <a:p>
+            <a:r>
+              <a:rPr lang="en-US" smtClean="0">
+                <a:latin typeface="Chiller" panose="04020404031007020602" pitchFamily="82" charset="0"/>
+              </a:rPr>
+              <a:t>Team Lich</a:t>
+            </a:r>
+            <a:endParaRPr lang="en-US" dirty="0">
+              <a:latin typeface="Chiller" panose="04020404031007020602" pitchFamily="82" charset="0"/>
+            </a:endParaRPr>
+          </a:p>
+        </p:txBody>
+      </p:sp>
+      <p:sp>
+        <p:nvSpPr>
+          <p:cNvPr id="5" name="Контейнер за номер на слайда 4"/>
+          <p:cNvSpPr>
+            <a:spLocks noGrp="1"/>
+          </p:cNvSpPr>
+          <p:nvPr>
+            <p:ph type="sldNum" sz="quarter" idx="12"/>
+          </p:nvPr>
+        </p:nvSpPr>
+        <p:spPr/>
+        <p:txBody>
+          <a:bodyPr/>
+          <a:lstStyle/>
+          <a:p>
+            <a:fld id="{D57F1E4F-1CFF-5643-939E-02111984F565}" type="slidenum">
+              <a:rPr lang="en-US" smtClean="0"/>
+              <a:t>4</a:t>
+            </a:fld>
+            <a:endParaRPr lang="en-US" dirty="0"/>
+          </a:p>
+        </p:txBody>
+      </p:sp>
+    </p:spTree>
+    <p:extLst>
+      <p:ext uri="{BB962C8B-B14F-4D97-AF65-F5344CB8AC3E}">
+        <p14:creationId xmlns:p14="http://schemas.microsoft.com/office/powerpoint/2010/main" val="385818553"/>
+      </p:ext>
+    </p:extLst>
+  </p:cSld>
+  <p:clrMapOvr>
+    <a:masterClrMapping/>
+  </p:clrMapOvr>
+  <p:timing>
+    <p:tnLst>
+      <p:par>
+        <p:cTn id="1" dur="indefinite" restart="never" nodeType="tmRoot"/>
+      </p:par>
+    </p:tnLst>
+  </p:timing>
+</p:sld>
+</file>
+
+<file path=ppt/slides/slide5.xml><?xml version="1.0" encoding="utf-8"?>
+<p:sld xmlns:a="http://schemas.openxmlformats.org/drawingml/2006/main" xmlns:r="http://schemas.openxmlformats.org/officeDocument/2006/relationships" xmlns:p="http://schemas.openxmlformats.org/presentationml/2006/main">
+  <p:cSld>
+    <p:spTree>
+      <p:nvGrpSpPr>
+        <p:cNvPr id="1" name=""/>
+        <p:cNvGrpSpPr/>
+        <p:nvPr/>
+      </p:nvGrpSpPr>
+      <p:grpSpPr>
+        <a:xfrm>
+          <a:off x="0" y="0"/>
+          <a:ext cx="0" cy="0"/>
+          <a:chOff x="0" y="0"/>
+          <a:chExt cx="0" cy="0"/>
+        </a:xfrm>
+      </p:grpSpPr>
+      <p:sp>
+        <p:nvSpPr>
+          <p:cNvPr id="2" name="Контейнер за съдържание 1"/>
+          <p:cNvSpPr>
+            <a:spLocks noGrp="1"/>
+          </p:cNvSpPr>
+          <p:nvPr>
+            <p:ph idx="1"/>
+          </p:nvPr>
+        </p:nvSpPr>
+        <p:spPr/>
+        <p:txBody>
+          <a:bodyPr>
+            <a:normAutofit/>
+          </a:bodyPr>
+          <a:lstStyle/>
+          <a:p>
+            <a:r>
+              <a:rPr lang="en-US" sz="2800" dirty="0" smtClean="0"/>
+              <a:t>Complicated team collaboration in the free version</a:t>
+            </a:r>
+          </a:p>
+          <a:p>
+            <a:r>
+              <a:rPr lang="en-US" sz="2800" dirty="0" smtClean="0"/>
+              <a:t>Lack of access restrictions in the free version</a:t>
+            </a:r>
+            <a:endParaRPr lang="bg-BG" sz="2800" dirty="0"/>
+          </a:p>
+        </p:txBody>
+      </p:sp>
+      <p:sp>
+        <p:nvSpPr>
+          <p:cNvPr id="3" name="Заглавие 2"/>
+          <p:cNvSpPr>
+            <a:spLocks noGrp="1"/>
+          </p:cNvSpPr>
+          <p:nvPr>
+            <p:ph type="title"/>
+          </p:nvPr>
+        </p:nvSpPr>
+        <p:spPr/>
+        <p:txBody>
+          <a:bodyPr/>
+          <a:lstStyle/>
+          <a:p>
+            <a:r>
+              <a:rPr lang="en-US" dirty="0" smtClean="0"/>
+              <a:t>What can be better (in the free version)</a:t>
+            </a:r>
+            <a:endParaRPr lang="bg-BG" dirty="0"/>
+          </a:p>
+        </p:txBody>
+      </p:sp>
+      <p:sp>
+        <p:nvSpPr>
+          <p:cNvPr id="4" name="Контейнер за долния колонтитул 3"/>
+          <p:cNvSpPr>
+            <a:spLocks noGrp="1"/>
+          </p:cNvSpPr>
+          <p:nvPr>
+            <p:ph type="ftr" sz="quarter" idx="11"/>
+          </p:nvPr>
+        </p:nvSpPr>
+        <p:spPr/>
+        <p:txBody>
+          <a:bodyPr/>
+          <a:lstStyle/>
+          <a:p>
+            <a:r>
+              <a:rPr lang="en-US" smtClean="0">
+                <a:latin typeface="Chiller" panose="04020404031007020602" pitchFamily="82" charset="0"/>
+              </a:rPr>
+              <a:t>Team Lich</a:t>
+            </a:r>
+            <a:endParaRPr lang="en-US" dirty="0">
+              <a:latin typeface="Chiller" panose="04020404031007020602" pitchFamily="82" charset="0"/>
+            </a:endParaRPr>
+          </a:p>
+        </p:txBody>
+      </p:sp>
+      <p:sp>
+        <p:nvSpPr>
+          <p:cNvPr id="5" name="Контейнер за номер на слайда 4"/>
+          <p:cNvSpPr>
+            <a:spLocks noGrp="1"/>
+          </p:cNvSpPr>
+          <p:nvPr>
+            <p:ph type="sldNum" sz="quarter" idx="12"/>
+          </p:nvPr>
+        </p:nvSpPr>
+        <p:spPr/>
+        <p:txBody>
+          <a:bodyPr/>
+          <a:lstStyle/>
+          <a:p>
+            <a:fld id="{D57F1E4F-1CFF-5643-939E-02111984F565}" type="slidenum">
+              <a:rPr lang="en-US" smtClean="0"/>
+              <a:t>5</a:t>
+            </a:fld>
+            <a:endParaRPr lang="en-US" dirty="0"/>
+          </a:p>
+        </p:txBody>
+      </p:sp>
+    </p:spTree>
+    <p:extLst>
+      <p:ext uri="{BB962C8B-B14F-4D97-AF65-F5344CB8AC3E}">
+        <p14:creationId xmlns:p14="http://schemas.microsoft.com/office/powerpoint/2010/main" val="2987640348"/>
+      </p:ext>
+    </p:extLst>
+  </p:cSld>
+  <p:clrMapOvr>
+    <a:masterClrMapping/>
+  </p:clrMapOvr>
+  <p:timing>
+    <p:tnLst>
+      <p:par>
+        <p:cTn id="1" dur="indefinite" restart="never" nodeType="tmRoot"/>
+      </p:par>
+    </p:tnLst>
+  </p:timing>
+</p:sld>
+</file>
+
+<file path=ppt/slides/slide6.xml><?xml version="1.0" encoding="utf-8"?>
+<p:sld xmlns:a="http://schemas.openxmlformats.org/drawingml/2006/main" xmlns:r="http://schemas.openxmlformats.org/officeDocument/2006/relationships" xmlns:p="http://schemas.openxmlformats.org/presentationml/2006/main">
+  <p:cSld>
+    <p:spTree>
+      <p:nvGrpSpPr>
+        <p:cNvPr id="1" name=""/>
+        <p:cNvGrpSpPr/>
+        <p:nvPr/>
+      </p:nvGrpSpPr>
+      <p:grpSpPr>
+        <a:xfrm>
+          <a:off x="0" y="0"/>
+          <a:ext cx="0" cy="0"/>
+          <a:chOff x="0" y="0"/>
+          <a:chExt cx="0" cy="0"/>
+        </a:xfrm>
+      </p:grpSpPr>
+      <p:pic>
+        <p:nvPicPr>
+          <p:cNvPr id="6" name="Контейнер за съдържание 5"/>
+          <p:cNvPicPr>
+            <a:picLocks noGrp="1" noChangeAspect="1"/>
+          </p:cNvPicPr>
+          <p:nvPr>
+            <p:ph idx="1"/>
+          </p:nvPr>
+        </p:nvPicPr>
+        <p:blipFill>
+          <a:blip r:embed="rId2">
+            <a:extLst>
+              <a:ext uri="{28A0092B-C50C-407E-A947-70E740481C1C}">
+                <a14:useLocalDpi xmlns:a14="http://schemas.microsoft.com/office/drawing/2010/main" val="0"/>
+              </a:ext>
+            </a:extLst>
+          </a:blip>
+          <a:stretch>
+            <a:fillRect/>
+          </a:stretch>
+        </p:blipFill>
+        <p:spPr>
+          <a:xfrm>
+            <a:off x="1678387" y="2052638"/>
+            <a:ext cx="7797002" cy="4195762"/>
+          </a:xfrm>
+        </p:spPr>
+      </p:pic>
+      <p:sp>
+        <p:nvSpPr>
+          <p:cNvPr id="3" name="Заглавие 2"/>
+          <p:cNvSpPr>
+            <a:spLocks noGrp="1"/>
+          </p:cNvSpPr>
+          <p:nvPr>
+            <p:ph type="title"/>
+          </p:nvPr>
+        </p:nvSpPr>
+        <p:spPr/>
+        <p:txBody>
+          <a:bodyPr/>
+          <a:lstStyle/>
+          <a:p>
+            <a:r>
+              <a:rPr lang="en-US" dirty="0" smtClean="0"/>
+              <a:t>Live Demo</a:t>
+            </a:r>
+            <a:endParaRPr lang="bg-BG" dirty="0"/>
+          </a:p>
+        </p:txBody>
+      </p:sp>
+      <p:sp>
+        <p:nvSpPr>
+          <p:cNvPr id="4" name="Контейнер за долния колонтитул 3"/>
+          <p:cNvSpPr>
+            <a:spLocks noGrp="1"/>
+          </p:cNvSpPr>
+          <p:nvPr>
+            <p:ph type="ftr" sz="quarter" idx="11"/>
+          </p:nvPr>
+        </p:nvSpPr>
+        <p:spPr/>
+        <p:txBody>
+          <a:bodyPr/>
+          <a:lstStyle/>
+          <a:p>
+            <a:r>
+              <a:rPr lang="en-US" smtClean="0">
+                <a:latin typeface="Chiller" panose="04020404031007020602" pitchFamily="82" charset="0"/>
+              </a:rPr>
+              <a:t>Team Lich</a:t>
+            </a:r>
+            <a:endParaRPr lang="en-US" dirty="0">
+              <a:latin typeface="Chiller" panose="04020404031007020602" pitchFamily="82" charset="0"/>
+            </a:endParaRPr>
+          </a:p>
+        </p:txBody>
+      </p:sp>
+      <p:sp>
+        <p:nvSpPr>
+          <p:cNvPr id="5" name="Контейнер за номер на слайда 4"/>
+          <p:cNvSpPr>
+            <a:spLocks noGrp="1"/>
+          </p:cNvSpPr>
+          <p:nvPr>
+            <p:ph type="sldNum" sz="quarter" idx="12"/>
+          </p:nvPr>
+        </p:nvSpPr>
+        <p:spPr/>
+        <p:txBody>
+          <a:bodyPr/>
+          <a:lstStyle/>
+          <a:p>
+            <a:fld id="{D57F1E4F-1CFF-5643-939E-02111984F565}" type="slidenum">
+              <a:rPr lang="en-US" smtClean="0"/>
+              <a:t>6</a:t>
+            </a:fld>
+            <a:endParaRPr lang="en-US" dirty="0"/>
+          </a:p>
+        </p:txBody>
+      </p:sp>
+    </p:spTree>
+    <p:extLst>
+      <p:ext uri="{BB962C8B-B14F-4D97-AF65-F5344CB8AC3E}">
+        <p14:creationId xmlns:p14="http://schemas.microsoft.com/office/powerpoint/2010/main" val="3448231017"/>
+      </p:ext>
+    </p:extLst>
+  </p:cSld>
+  <p:clrMapOvr>
+    <a:masterClrMapping/>
+  </p:clrMapOvr>
 </p:sld>
 </file>
 

</xml_diff>